<commit_message>
I proimise final commit for mvp
</commit_message>
<xml_diff>
--- a/MaileX.pptx
+++ b/MaileX.pptx
@@ -12,35 +12,36 @@
     <p:sldId id="260" r:id="rId6"/>
     <p:sldId id="261" r:id="rId7"/>
     <p:sldId id="262" r:id="rId8"/>
+    <p:sldId id="263" r:id="rId9"/>
   </p:sldIdLst>
   <p:sldSz cx="18288000" cy="10287000"/>
   <p:notesSz cx="6858000" cy="9144000"/>
   <p:embeddedFontLst>
     <p:embeddedFont>
       <p:font typeface="Aileron Heavy" panose="020B0604020202020204" charset="0"/>
-      <p:regular r:id="rId9"/>
+      <p:regular r:id="rId10"/>
     </p:embeddedFont>
     <p:embeddedFont>
       <p:font typeface="Calibri" panose="020F0502020204030204" pitchFamily="34" charset="0"/>
-      <p:regular r:id="rId10"/>
-      <p:bold r:id="rId11"/>
-      <p:italic r:id="rId12"/>
-      <p:boldItalic r:id="rId13"/>
+      <p:regular r:id="rId11"/>
+      <p:bold r:id="rId12"/>
+      <p:italic r:id="rId13"/>
+      <p:boldItalic r:id="rId14"/>
     </p:embeddedFont>
     <p:embeddedFont>
       <p:font typeface="Old Standard" panose="020B0604020202020204" charset="0"/>
-      <p:regular r:id="rId14"/>
+      <p:regular r:id="rId15"/>
     </p:embeddedFont>
     <p:embeddedFont>
       <p:font typeface="Old Standard Bold" panose="020B0604020202020204" charset="0"/>
-      <p:regular r:id="rId15"/>
+      <p:regular r:id="rId16"/>
     </p:embeddedFont>
     <p:embeddedFont>
       <p:font typeface="Roboto" panose="02000000000000000000" pitchFamily="2" charset="0"/>
-      <p:regular r:id="rId16"/>
-      <p:bold r:id="rId17"/>
-      <p:italic r:id="rId18"/>
-      <p:boldItalic r:id="rId19"/>
+      <p:regular r:id="rId17"/>
+      <p:bold r:id="rId18"/>
+      <p:italic r:id="rId19"/>
+      <p:boldItalic r:id="rId20"/>
     </p:embeddedFont>
   </p:embeddedFontLst>
   <p:defaultTextStyle>
@@ -337,7 +338,7 @@
             <a:fld id="{1D8BD707-D9CF-40AE-B4C6-C98DA3205C09}" type="datetimeFigureOut">
               <a:rPr lang="en-US" smtClean="0"/>
               <a:pPr/>
-              <a:t>2/10/2022</a:t>
+              <a:t>2/16/2022</a:t>
             </a:fld>
             <a:endParaRPr lang="en-US"/>
           </a:p>
@@ -502,7 +503,7 @@
             <a:fld id="{1D8BD707-D9CF-40AE-B4C6-C98DA3205C09}" type="datetimeFigureOut">
               <a:rPr lang="en-US" smtClean="0"/>
               <a:pPr/>
-              <a:t>2/10/2022</a:t>
+              <a:t>2/16/2022</a:t>
             </a:fld>
             <a:endParaRPr lang="en-US"/>
           </a:p>
@@ -677,7 +678,7 @@
             <a:fld id="{1D8BD707-D9CF-40AE-B4C6-C98DA3205C09}" type="datetimeFigureOut">
               <a:rPr lang="en-US" smtClean="0"/>
               <a:pPr/>
-              <a:t>2/10/2022</a:t>
+              <a:t>2/16/2022</a:t>
             </a:fld>
             <a:endParaRPr lang="en-US"/>
           </a:p>
@@ -842,7 +843,7 @@
             <a:fld id="{1D8BD707-D9CF-40AE-B4C6-C98DA3205C09}" type="datetimeFigureOut">
               <a:rPr lang="en-US" smtClean="0"/>
               <a:pPr/>
-              <a:t>2/10/2022</a:t>
+              <a:t>2/16/2022</a:t>
             </a:fld>
             <a:endParaRPr lang="en-US"/>
           </a:p>
@@ -1084,7 +1085,7 @@
             <a:fld id="{1D8BD707-D9CF-40AE-B4C6-C98DA3205C09}" type="datetimeFigureOut">
               <a:rPr lang="en-US" smtClean="0"/>
               <a:pPr/>
-              <a:t>2/10/2022</a:t>
+              <a:t>2/16/2022</a:t>
             </a:fld>
             <a:endParaRPr lang="en-US"/>
           </a:p>
@@ -1366,7 +1367,7 @@
             <a:fld id="{1D8BD707-D9CF-40AE-B4C6-C98DA3205C09}" type="datetimeFigureOut">
               <a:rPr lang="en-US" smtClean="0"/>
               <a:pPr/>
-              <a:t>2/10/2022</a:t>
+              <a:t>2/16/2022</a:t>
             </a:fld>
             <a:endParaRPr lang="en-US"/>
           </a:p>
@@ -1782,7 +1783,7 @@
             <a:fld id="{1D8BD707-D9CF-40AE-B4C6-C98DA3205C09}" type="datetimeFigureOut">
               <a:rPr lang="en-US" smtClean="0"/>
               <a:pPr/>
-              <a:t>2/10/2022</a:t>
+              <a:t>2/16/2022</a:t>
             </a:fld>
             <a:endParaRPr lang="en-US"/>
           </a:p>
@@ -1896,7 +1897,7 @@
             <a:fld id="{1D8BD707-D9CF-40AE-B4C6-C98DA3205C09}" type="datetimeFigureOut">
               <a:rPr lang="en-US" smtClean="0"/>
               <a:pPr/>
-              <a:t>2/10/2022</a:t>
+              <a:t>2/16/2022</a:t>
             </a:fld>
             <a:endParaRPr lang="en-US"/>
           </a:p>
@@ -1988,7 +1989,7 @@
             <a:fld id="{1D8BD707-D9CF-40AE-B4C6-C98DA3205C09}" type="datetimeFigureOut">
               <a:rPr lang="en-US" smtClean="0"/>
               <a:pPr/>
-              <a:t>2/10/2022</a:t>
+              <a:t>2/16/2022</a:t>
             </a:fld>
             <a:endParaRPr lang="en-US"/>
           </a:p>
@@ -2260,7 +2261,7 @@
             <a:fld id="{1D8BD707-D9CF-40AE-B4C6-C98DA3205C09}" type="datetimeFigureOut">
               <a:rPr lang="en-US" smtClean="0"/>
               <a:pPr/>
-              <a:t>2/10/2022</a:t>
+              <a:t>2/16/2022</a:t>
             </a:fld>
             <a:endParaRPr lang="en-US"/>
           </a:p>
@@ -2509,7 +2510,7 @@
             <a:fld id="{1D8BD707-D9CF-40AE-B4C6-C98DA3205C09}" type="datetimeFigureOut">
               <a:rPr lang="en-US" smtClean="0"/>
               <a:pPr/>
-              <a:t>2/10/2022</a:t>
+              <a:t>2/16/2022</a:t>
             </a:fld>
             <a:endParaRPr lang="en-US"/>
           </a:p>
@@ -2717,7 +2718,7 @@
             <a:fld id="{1D8BD707-D9CF-40AE-B4C6-C98DA3205C09}" type="datetimeFigureOut">
               <a:rPr lang="en-US" smtClean="0"/>
               <a:pPr/>
-              <a:t>2/10/2022</a:t>
+              <a:t>2/16/2022</a:t>
             </a:fld>
             <a:endParaRPr lang="en-US"/>
           </a:p>
@@ -4623,10 +4624,10 @@
         </p:nvGrpSpPr>
         <p:grpSpPr>
           <a:xfrm>
-            <a:off x="1028700" y="530690"/>
-            <a:ext cx="7778406" cy="9225621"/>
-            <a:chOff x="0" y="0"/>
-            <a:chExt cx="10371208" cy="12300827"/>
+            <a:off x="1028700" y="444965"/>
+            <a:ext cx="7778406" cy="9311346"/>
+            <a:chOff x="0" y="-114300"/>
+            <a:chExt cx="10371208" cy="12415127"/>
           </a:xfrm>
         </p:grpSpPr>
         <p:sp>
@@ -4675,8 +4676,8 @@
           </p:nvSpPr>
           <p:spPr>
             <a:xfrm>
-              <a:off x="0" y="1167310"/>
-              <a:ext cx="10371208" cy="2160481"/>
+              <a:off x="0" y="1167311"/>
+              <a:ext cx="10371208" cy="3257473"/>
             </a:xfrm>
             <a:prstGeom prst="rect">
               <a:avLst/>
@@ -4694,13 +4695,31 @@
                 </a:lnSpc>
               </a:pPr>
               <a:r>
-                <a:rPr lang="en-US" sz="2300">
+                <a:rPr lang="en-US" sz="2300" dirty="0">
                   <a:solidFill>
                     <a:srgbClr val="17161C"/>
                   </a:solidFill>
                   <a:latin typeface="Old Standard"/>
                 </a:rPr>
-                <a:t>- React js (Front-End Framework)</a:t>
+                <a:t>- React </a:t>
+              </a:r>
+              <a:r>
+                <a:rPr lang="en-US" sz="2300" dirty="0" err="1">
+                  <a:solidFill>
+                    <a:srgbClr val="17161C"/>
+                  </a:solidFill>
+                  <a:latin typeface="Old Standard"/>
+                </a:rPr>
+                <a:t>js</a:t>
+              </a:r>
+              <a:r>
+                <a:rPr lang="en-US" sz="2300" dirty="0">
+                  <a:solidFill>
+                    <a:srgbClr val="17161C"/>
+                  </a:solidFill>
+                  <a:latin typeface="Old Standard"/>
+                </a:rPr>
+                <a:t> (Front-End Framework)</a:t>
               </a:r>
             </a:p>
             <a:p>
@@ -4710,7 +4729,7 @@
                 </a:lnSpc>
               </a:pPr>
               <a:r>
-                <a:rPr lang="en-US" sz="2300">
+                <a:rPr lang="en-US" sz="2300" dirty="0">
                   <a:solidFill>
                     <a:srgbClr val="17161C"/>
                   </a:solidFill>
@@ -4726,13 +4745,31 @@
                 </a:lnSpc>
               </a:pPr>
               <a:r>
-                <a:rPr lang="en-US" sz="2300">
+                <a:rPr lang="en-US" sz="2300" dirty="0">
                   <a:solidFill>
                     <a:srgbClr val="17161C"/>
                   </a:solidFill>
                   <a:latin typeface="Old Standard"/>
                 </a:rPr>
-                <a:t>- Graphql ( Database Manipulation Language )</a:t>
+                <a:t>- </a:t>
+              </a:r>
+              <a:r>
+                <a:rPr lang="en-US" sz="2300" dirty="0" err="1">
+                  <a:solidFill>
+                    <a:srgbClr val="17161C"/>
+                  </a:solidFill>
+                  <a:latin typeface="Old Standard"/>
+                </a:rPr>
+                <a:t>Graphql</a:t>
+              </a:r>
+              <a:r>
+                <a:rPr lang="en-US" sz="2300" dirty="0">
+                  <a:solidFill>
+                    <a:srgbClr val="17161C"/>
+                  </a:solidFill>
+                  <a:latin typeface="Old Standard"/>
+                </a:rPr>
+                <a:t> ( Database Manipulation Language )</a:t>
               </a:r>
             </a:p>
             <a:p>
@@ -4745,7 +4782,7 @@
                 </a:spcBef>
               </a:pPr>
               <a:r>
-                <a:rPr lang="en-US" sz="2300">
+                <a:rPr lang="en-US" sz="2300" dirty="0">
                   <a:solidFill>
                     <a:srgbClr val="17161C"/>
                   </a:solidFill>
@@ -4753,6 +4790,58 @@
                 </a:rPr>
                 <a:t>- MongoDB ( Database )</a:t>
               </a:r>
+            </a:p>
+            <a:p>
+              <a:pPr>
+                <a:lnSpc>
+                  <a:spcPts val="3220"/>
+                </a:lnSpc>
+                <a:spcBef>
+                  <a:spcPct val="0"/>
+                </a:spcBef>
+              </a:pPr>
+              <a:r>
+                <a:rPr lang="en-US" sz="2300" dirty="0">
+                  <a:solidFill>
+                    <a:srgbClr val="17161C"/>
+                  </a:solidFill>
+                  <a:latin typeface="Old Standard"/>
+                </a:rPr>
+                <a:t>- Express/Node </a:t>
+              </a:r>
+              <a:r>
+                <a:rPr lang="en-US" sz="2300" dirty="0" err="1">
+                  <a:solidFill>
+                    <a:srgbClr val="17161C"/>
+                  </a:solidFill>
+                  <a:latin typeface="Old Standard"/>
+                </a:rPr>
+                <a:t>js</a:t>
+              </a:r>
+              <a:endParaRPr lang="en-US" sz="2300" dirty="0">
+                <a:solidFill>
+                  <a:srgbClr val="17161C"/>
+                </a:solidFill>
+                <a:latin typeface="Old Standard"/>
+              </a:endParaRPr>
+            </a:p>
+            <a:p>
+              <a:pPr marL="342900" indent="-342900">
+                <a:lnSpc>
+                  <a:spcPts val="3220"/>
+                </a:lnSpc>
+                <a:spcBef>
+                  <a:spcPct val="0"/>
+                </a:spcBef>
+                <a:buFontTx/>
+                <a:buChar char="-"/>
+              </a:pPr>
+              <a:endParaRPr lang="en-US" sz="2300" dirty="0">
+                <a:solidFill>
+                  <a:srgbClr val="17161C"/>
+                </a:solidFill>
+                <a:latin typeface="Old Standard"/>
+              </a:endParaRPr>
             </a:p>
           </p:txBody>
         </p:sp>
@@ -7357,6 +7446,440 @@
         </p:sp>
       </p:grpSp>
     </p:spTree>
+  </p:cSld>
+  <p:clrMapOvr>
+    <a:masterClrMapping/>
+  </p:clrMapOvr>
+</p:sld>
+</file>
+
+<file path=ppt/slides/slide8.xml><?xml version="1.0" encoding="utf-8"?>
+<p:sld xmlns:a="http://schemas.openxmlformats.org/drawingml/2006/main" xmlns:r="http://schemas.openxmlformats.org/officeDocument/2006/relationships" xmlns:p="http://schemas.openxmlformats.org/presentationml/2006/main">
+  <p:cSld>
+    <p:bg>
+      <p:bgPr>
+        <a:solidFill>
+          <a:srgbClr val="17161C"/>
+        </a:solidFill>
+        <a:effectLst/>
+      </p:bgPr>
+    </p:bg>
+    <p:spTree>
+      <p:nvGrpSpPr>
+        <p:cNvPr id="1" name=""/>
+        <p:cNvGrpSpPr/>
+        <p:nvPr/>
+      </p:nvGrpSpPr>
+      <p:grpSpPr>
+        <a:xfrm>
+          <a:off x="0" y="0"/>
+          <a:ext cx="0" cy="0"/>
+          <a:chOff x="0" y="0"/>
+          <a:chExt cx="0" cy="0"/>
+        </a:xfrm>
+      </p:grpSpPr>
+      <p:sp>
+        <p:nvSpPr>
+          <p:cNvPr id="2" name="AutoShape 2"/>
+          <p:cNvSpPr/>
+          <p:nvPr/>
+        </p:nvSpPr>
+        <p:spPr>
+          <a:xfrm>
+            <a:off x="0" y="0"/>
+            <a:ext cx="6515366" cy="10287000"/>
+          </a:xfrm>
+          <a:prstGeom prst="rect">
+            <a:avLst/>
+          </a:prstGeom>
+          <a:solidFill>
+            <a:srgbClr val="F7F4FA"/>
+          </a:solidFill>
+        </p:spPr>
+      </p:sp>
+      <p:grpSp>
+        <p:nvGrpSpPr>
+          <p:cNvPr id="3" name="Group 3"/>
+          <p:cNvGrpSpPr>
+            <a:grpSpLocks noChangeAspect="1"/>
+          </p:cNvGrpSpPr>
+          <p:nvPr/>
+        </p:nvGrpSpPr>
+        <p:grpSpPr>
+          <a:xfrm>
+            <a:off x="1028700" y="1504835"/>
+            <a:ext cx="3237711" cy="3237711"/>
+            <a:chOff x="0" y="0"/>
+            <a:chExt cx="14400530" cy="14400530"/>
+          </a:xfrm>
+        </p:grpSpPr>
+        <p:sp>
+          <p:nvSpPr>
+            <p:cNvPr id="4" name="Freeform 4"/>
+            <p:cNvSpPr/>
+            <p:nvPr/>
+          </p:nvSpPr>
+          <p:spPr>
+            <a:xfrm>
+              <a:off x="0" y="0"/>
+              <a:ext cx="14400530" cy="14399261"/>
+            </a:xfrm>
+            <a:custGeom>
+              <a:avLst/>
+              <a:gdLst/>
+              <a:ahLst/>
+              <a:cxnLst/>
+              <a:rect l="l" t="t" r="r" b="b"/>
+              <a:pathLst>
+                <a:path w="14400530" h="14399261">
+                  <a:moveTo>
+                    <a:pt x="7199630" y="0"/>
+                  </a:moveTo>
+                  <a:cubicBezTo>
+                    <a:pt x="3223260" y="0"/>
+                    <a:pt x="0" y="3223260"/>
+                    <a:pt x="0" y="7199630"/>
+                  </a:cubicBezTo>
+                  <a:cubicBezTo>
+                    <a:pt x="0" y="11176001"/>
+                    <a:pt x="3223260" y="14399261"/>
+                    <a:pt x="7199630" y="14399261"/>
+                  </a:cubicBezTo>
+                  <a:lnTo>
+                    <a:pt x="14399261" y="14399261"/>
+                  </a:lnTo>
+                  <a:lnTo>
+                    <a:pt x="14399261" y="7199630"/>
+                  </a:lnTo>
+                  <a:cubicBezTo>
+                    <a:pt x="14400530" y="3223260"/>
+                    <a:pt x="11176000" y="0"/>
+                    <a:pt x="7199630" y="0"/>
+                  </a:cubicBezTo>
+                  <a:close/>
+                </a:path>
+              </a:pathLst>
+            </a:custGeom>
+            <a:solidFill>
+              <a:srgbClr val="009688"/>
+            </a:solidFill>
+          </p:spPr>
+        </p:sp>
+      </p:grpSp>
+      <p:pic>
+        <p:nvPicPr>
+          <p:cNvPr id="5" name="Picture 5"/>
+          <p:cNvPicPr>
+            <a:picLocks noChangeAspect="1"/>
+          </p:cNvPicPr>
+          <p:nvPr/>
+        </p:nvPicPr>
+        <p:blipFill>
+          <a:blip r:embed="rId2">
+            <a:extLst>
+              <a:ext uri="{28A0092B-C50C-407E-A947-70E740481C1C}">
+                <a14:useLocalDpi xmlns:a14="http://schemas.microsoft.com/office/drawing/2010/main" val="0"/>
+              </a:ext>
+              <a:ext uri="{96DAC541-7B7A-43D3-8B79-37D633B846F1}">
+                <asvg:svgBlip xmlns:asvg="http://schemas.microsoft.com/office/drawing/2016/SVG/main" r:embed="rId3"/>
+              </a:ext>
+            </a:extLst>
+          </a:blip>
+          <a:srcRect/>
+          <a:stretch>
+            <a:fillRect/>
+          </a:stretch>
+        </p:blipFill>
+        <p:spPr>
+          <a:xfrm rot="5400000">
+            <a:off x="4514457" y="1754964"/>
+            <a:ext cx="3095939" cy="2879223"/>
+          </a:xfrm>
+          <a:prstGeom prst="rect">
+            <a:avLst/>
+          </a:prstGeom>
+        </p:spPr>
+      </p:pic>
+      <p:grpSp>
+        <p:nvGrpSpPr>
+          <p:cNvPr id="6" name="Group 6"/>
+          <p:cNvGrpSpPr/>
+          <p:nvPr/>
+        </p:nvGrpSpPr>
+        <p:grpSpPr>
+          <a:xfrm>
+            <a:off x="8639464" y="3632990"/>
+            <a:ext cx="7336182" cy="2830686"/>
+            <a:chOff x="0" y="-209550"/>
+            <a:chExt cx="9781576" cy="3774249"/>
+          </a:xfrm>
+        </p:grpSpPr>
+        <p:sp>
+          <p:nvSpPr>
+            <p:cNvPr id="7" name="TextBox 7"/>
+            <p:cNvSpPr txBox="1"/>
+            <p:nvPr/>
+          </p:nvSpPr>
+          <p:spPr>
+            <a:xfrm>
+              <a:off x="0" y="-209550"/>
+              <a:ext cx="9781576" cy="2542117"/>
+            </a:xfrm>
+            <a:prstGeom prst="rect">
+              <a:avLst/>
+            </a:prstGeom>
+          </p:spPr>
+          <p:txBody>
+            <a:bodyPr lIns="0" tIns="0" rIns="0" bIns="0" rtlCol="0" anchor="t">
+              <a:spAutoFit/>
+            </a:bodyPr>
+            <a:lstStyle/>
+            <a:p>
+              <a:pPr>
+                <a:lnSpc>
+                  <a:spcPts val="13224"/>
+                </a:lnSpc>
+              </a:pPr>
+              <a:r>
+                <a:rPr lang="en-US" sz="11499">
+                  <a:solidFill>
+                    <a:srgbClr val="F7F4FA"/>
+                  </a:solidFill>
+                  <a:latin typeface="Old Standard"/>
+                </a:rPr>
+                <a:t>MaileX</a:t>
+              </a:r>
+            </a:p>
+          </p:txBody>
+        </p:sp>
+        <p:sp>
+          <p:nvSpPr>
+            <p:cNvPr id="8" name="TextBox 8"/>
+            <p:cNvSpPr txBox="1"/>
+            <p:nvPr/>
+          </p:nvSpPr>
+          <p:spPr>
+            <a:xfrm>
+              <a:off x="0" y="2929054"/>
+              <a:ext cx="9781576" cy="635645"/>
+            </a:xfrm>
+            <a:prstGeom prst="rect">
+              <a:avLst/>
+            </a:prstGeom>
+          </p:spPr>
+          <p:txBody>
+            <a:bodyPr lIns="0" tIns="0" rIns="0" bIns="0" rtlCol="0" anchor="t">
+              <a:spAutoFit/>
+            </a:bodyPr>
+            <a:lstStyle/>
+            <a:p>
+              <a:pPr>
+                <a:lnSpc>
+                  <a:spcPts val="3919"/>
+                </a:lnSpc>
+                <a:spcBef>
+                  <a:spcPct val="0"/>
+                </a:spcBef>
+              </a:pPr>
+              <a:r>
+                <a:rPr lang="en-US" sz="2799" dirty="0">
+                  <a:solidFill>
+                    <a:srgbClr val="F7F4FA"/>
+                  </a:solidFill>
+                  <a:latin typeface="Old Standard"/>
+                </a:rPr>
+                <a:t>Questions?</a:t>
+              </a:r>
+            </a:p>
+          </p:txBody>
+        </p:sp>
+      </p:grpSp>
+      <p:pic>
+        <p:nvPicPr>
+          <p:cNvPr id="9" name="Picture 9"/>
+          <p:cNvPicPr>
+            <a:picLocks noChangeAspect="1"/>
+          </p:cNvPicPr>
+          <p:nvPr/>
+        </p:nvPicPr>
+        <p:blipFill>
+          <a:blip r:embed="rId4" cstate="print">
+            <a:extLst>
+              <a:ext uri="{28A0092B-C50C-407E-A947-70E740481C1C}">
+                <a14:useLocalDpi xmlns:a14="http://schemas.microsoft.com/office/drawing/2010/main" val="0"/>
+              </a:ext>
+              <a:ext uri="{96DAC541-7B7A-43D3-8B79-37D633B846F1}">
+                <asvg:svgBlip xmlns:asvg="http://schemas.microsoft.com/office/drawing/2016/SVG/main" r:embed="rId5"/>
+              </a:ext>
+            </a:extLst>
+          </a:blip>
+          <a:srcRect/>
+          <a:stretch>
+            <a:fillRect/>
+          </a:stretch>
+        </p:blipFill>
+        <p:spPr>
+          <a:xfrm rot="-10800000">
+            <a:off x="4622815" y="5402609"/>
+            <a:ext cx="1892551" cy="3379556"/>
+          </a:xfrm>
+          <a:prstGeom prst="rect">
+            <a:avLst/>
+          </a:prstGeom>
+        </p:spPr>
+      </p:pic>
+      <p:pic>
+        <p:nvPicPr>
+          <p:cNvPr id="10" name="Picture 10"/>
+          <p:cNvPicPr>
+            <a:picLocks noChangeAspect="1"/>
+          </p:cNvPicPr>
+          <p:nvPr/>
+        </p:nvPicPr>
+        <p:blipFill>
+          <a:blip r:embed="rId2">
+            <a:extLst>
+              <a:ext uri="{28A0092B-C50C-407E-A947-70E740481C1C}">
+                <a14:useLocalDpi xmlns:a14="http://schemas.microsoft.com/office/drawing/2010/main" val="0"/>
+              </a:ext>
+              <a:ext uri="{96DAC541-7B7A-43D3-8B79-37D633B846F1}">
+                <asvg:svgBlip xmlns:asvg="http://schemas.microsoft.com/office/drawing/2016/SVG/main" r:embed="rId3"/>
+              </a:ext>
+            </a:extLst>
+          </a:blip>
+          <a:srcRect/>
+          <a:stretch>
+            <a:fillRect/>
+          </a:stretch>
+        </p:blipFill>
+        <p:spPr>
+          <a:xfrm rot="5400000">
+            <a:off x="1295680" y="5510967"/>
+            <a:ext cx="3095939" cy="2879223"/>
+          </a:xfrm>
+          <a:prstGeom prst="rect">
+            <a:avLst/>
+          </a:prstGeom>
+        </p:spPr>
+      </p:pic>
+      <p:grpSp>
+        <p:nvGrpSpPr>
+          <p:cNvPr id="11" name="Group 11"/>
+          <p:cNvGrpSpPr>
+            <a:grpSpLocks noChangeAspect="1"/>
+          </p:cNvGrpSpPr>
+          <p:nvPr/>
+        </p:nvGrpSpPr>
+        <p:grpSpPr>
+          <a:xfrm rot="5400000">
+            <a:off x="1028700" y="8082026"/>
+            <a:ext cx="700140" cy="700140"/>
+            <a:chOff x="1371600" y="6705600"/>
+            <a:chExt cx="10972800" cy="10972800"/>
+          </a:xfrm>
+        </p:grpSpPr>
+        <p:sp>
+          <p:nvSpPr>
+            <p:cNvPr id="12" name="Freeform 12"/>
+            <p:cNvSpPr/>
+            <p:nvPr/>
+          </p:nvSpPr>
+          <p:spPr>
+            <a:xfrm>
+              <a:off x="1362808" y="6434629"/>
+              <a:ext cx="10990384" cy="11514742"/>
+            </a:xfrm>
+            <a:custGeom>
+              <a:avLst/>
+              <a:gdLst/>
+              <a:ahLst/>
+              <a:cxnLst/>
+              <a:rect l="l" t="t" r="r" b="b"/>
+              <a:pathLst>
+                <a:path w="10990384" h="11514742">
+                  <a:moveTo>
+                    <a:pt x="8792" y="5757371"/>
+                  </a:moveTo>
+                  <a:cubicBezTo>
+                    <a:pt x="0" y="7723318"/>
+                    <a:pt x="1043775" y="9543701"/>
+                    <a:pt x="2744885" y="10529222"/>
+                  </a:cubicBezTo>
+                  <a:cubicBezTo>
+                    <a:pt x="4445994" y="11514742"/>
+                    <a:pt x="6544389" y="11514742"/>
+                    <a:pt x="8245499" y="10529222"/>
+                  </a:cubicBezTo>
+                  <a:cubicBezTo>
+                    <a:pt x="9946609" y="9543701"/>
+                    <a:pt x="10990384" y="7723318"/>
+                    <a:pt x="10981592" y="5757371"/>
+                  </a:cubicBezTo>
+                  <a:cubicBezTo>
+                    <a:pt x="10990384" y="3791424"/>
+                    <a:pt x="9946609" y="1971041"/>
+                    <a:pt x="8245499" y="985520"/>
+                  </a:cubicBezTo>
+                  <a:cubicBezTo>
+                    <a:pt x="6544389" y="0"/>
+                    <a:pt x="4445994" y="0"/>
+                    <a:pt x="2744885" y="985520"/>
+                  </a:cubicBezTo>
+                  <a:cubicBezTo>
+                    <a:pt x="1043775" y="1971041"/>
+                    <a:pt x="0" y="3791424"/>
+                    <a:pt x="8792" y="5757371"/>
+                  </a:cubicBezTo>
+                  <a:close/>
+                </a:path>
+              </a:pathLst>
+            </a:custGeom>
+            <a:solidFill>
+              <a:srgbClr val="17161C"/>
+            </a:solidFill>
+          </p:spPr>
+        </p:sp>
+      </p:grpSp>
+      <p:pic>
+        <p:nvPicPr>
+          <p:cNvPr id="13" name="Picture 13"/>
+          <p:cNvPicPr>
+            <a:picLocks noChangeAspect="1"/>
+          </p:cNvPicPr>
+          <p:nvPr/>
+        </p:nvPicPr>
+        <p:blipFill>
+          <a:blip r:embed="rId6" cstate="print">
+            <a:extLst>
+              <a:ext uri="{28A0092B-C50C-407E-A947-70E740481C1C}">
+                <a14:useLocalDpi xmlns:a14="http://schemas.microsoft.com/office/drawing/2010/main" val="0"/>
+              </a:ext>
+              <a:ext uri="{96DAC541-7B7A-43D3-8B79-37D633B846F1}">
+                <asvg:svgBlip xmlns:asvg="http://schemas.microsoft.com/office/drawing/2016/SVG/main" r:embed="rId7"/>
+              </a:ext>
+            </a:extLst>
+          </a:blip>
+          <a:srcRect/>
+          <a:stretch>
+            <a:fillRect/>
+          </a:stretch>
+        </p:blipFill>
+        <p:spPr>
+          <a:xfrm>
+            <a:off x="17002191" y="1028700"/>
+            <a:ext cx="257109" cy="376665"/>
+          </a:xfrm>
+          <a:prstGeom prst="rect">
+            <a:avLst/>
+          </a:prstGeom>
+        </p:spPr>
+      </p:pic>
+    </p:spTree>
+    <p:extLst>
+      <p:ext uri="{BB962C8B-B14F-4D97-AF65-F5344CB8AC3E}">
+        <p14:creationId xmlns:p14="http://schemas.microsoft.com/office/powerpoint/2010/main" val="4222380311"/>
+      </p:ext>
+    </p:extLst>
   </p:cSld>
   <p:clrMapOvr>
     <a:masterClrMapping/>

</xml_diff>